<commit_message>
coirrected the database code with ;TrustServerCertificate=True
</commit_message>
<xml_diff>
--- a/12-Accessing databases.pptx
+++ b/12-Accessing databases.pptx
@@ -4572,7 +4572,7 @@
         <p:spPr/>
         <p:txBody>
           <a:bodyPr>
-            <a:normAutofit/>
+            <a:normAutofit lnSpcReduction="10000"/>
           </a:bodyPr>
           <a:lstStyle/>
           <a:p>
@@ -4712,6 +4712,130 @@
               <a:rPr lang="en-GB" b="0" baseline="0" dirty="0"/>
               <a:t> the code in a staging server and eventually on the client site. At each deployment stage you will have to search and replace every connection string. If you do, you will have to compile and test your code again! </a:t>
             </a:r>
+          </a:p>
+          <a:p>
+            <a:endParaRPr lang="en-GB" b="0" baseline="0" dirty="0"/>
+          </a:p>
+          <a:p>
+            <a:r>
+              <a:rPr lang="en-GB" sz="1200" dirty="0">
+                <a:solidFill>
+                  <a:srgbClr val="800000"/>
+                </a:solidFill>
+                <a:highlight>
+                  <a:srgbClr val="FFFFFF"/>
+                </a:highlight>
+                <a:latin typeface="Times New Roman" panose="02020603050405020304" pitchFamily="18" charset="0"/>
+                <a:cs typeface="Times New Roman" panose="02020603050405020304" pitchFamily="18" charset="0"/>
+              </a:rPr>
+              <a:t>What does </a:t>
+            </a:r>
+            <a:r>
+              <a:rPr lang="en-GB" sz="1200" b="1" dirty="0" err="1">
+                <a:solidFill>
+                  <a:srgbClr val="800000"/>
+                </a:solidFill>
+                <a:highlight>
+                  <a:srgbClr val="FFFFFF"/>
+                </a:highlight>
+                <a:latin typeface="Times New Roman" panose="02020603050405020304" pitchFamily="18" charset="0"/>
+                <a:cs typeface="Times New Roman" panose="02020603050405020304" pitchFamily="18" charset="0"/>
+              </a:rPr>
+              <a:t>TrustServerCertificate</a:t>
+            </a:r>
+            <a:r>
+              <a:rPr lang="en-GB" sz="1200" b="1" dirty="0">
+                <a:solidFill>
+                  <a:srgbClr val="800000"/>
+                </a:solidFill>
+                <a:highlight>
+                  <a:srgbClr val="FFFFFF"/>
+                </a:highlight>
+                <a:latin typeface="Times New Roman" panose="02020603050405020304" pitchFamily="18" charset="0"/>
+                <a:cs typeface="Times New Roman" panose="02020603050405020304" pitchFamily="18" charset="0"/>
+              </a:rPr>
+              <a:t>=True </a:t>
+            </a:r>
+            <a:r>
+              <a:rPr lang="en-GB" sz="1200" dirty="0">
+                <a:solidFill>
+                  <a:srgbClr val="800000"/>
+                </a:solidFill>
+                <a:highlight>
+                  <a:srgbClr val="FFFFFF"/>
+                </a:highlight>
+                <a:latin typeface="Times New Roman" panose="02020603050405020304" pitchFamily="18" charset="0"/>
+                <a:cs typeface="Times New Roman" panose="02020603050405020304" pitchFamily="18" charset="0"/>
+              </a:rPr>
+              <a:t>means?</a:t>
+            </a:r>
+            <a:endParaRPr lang="en-GB" b="1" dirty="0"/>
+          </a:p>
+          <a:p>
+            <a:r>
+              <a:rPr lang="en-GB" b="1" dirty="0"/>
+              <a:t>SQL Server Express</a:t>
+            </a:r>
+            <a:r>
+              <a:rPr lang="en-GB" dirty="0"/>
+              <a:t> is configured to require </a:t>
+            </a:r>
+            <a:r>
+              <a:rPr lang="en-GB" b="1" dirty="0"/>
+              <a:t>encrypted connections</a:t>
+            </a:r>
+            <a:r>
+              <a:rPr lang="en-GB" dirty="0"/>
+              <a:t> by default (TLS).</a:t>
+            </a:r>
+          </a:p>
+          <a:p>
+            <a:r>
+              <a:rPr lang="en-GB" dirty="0" err="1"/>
+              <a:t>SqlClient</a:t>
+            </a:r>
+            <a:r>
+              <a:rPr lang="en-GB" dirty="0"/>
+              <a:t> now </a:t>
+            </a:r>
+            <a:r>
+              <a:rPr lang="en-GB" b="1" dirty="0"/>
+              <a:t>enforces encryption by default</a:t>
+            </a:r>
+            <a:r>
+              <a:rPr lang="en-GB" dirty="0"/>
+              <a:t> in newer .NET versions (.NET 6/7+).</a:t>
+            </a:r>
+          </a:p>
+          <a:p>
+            <a:r>
+              <a:rPr lang="en-GB" dirty="0"/>
+              <a:t>If you miss this option, SQL Server has a </a:t>
+            </a:r>
+            <a:r>
+              <a:rPr lang="en-GB" b="1" dirty="0"/>
+              <a:t>self-signed certificate</a:t>
+            </a:r>
+            <a:r>
+              <a:rPr lang="en-GB" dirty="0"/>
+              <a:t> (or no proper CA), so .NET refuses to trust it, and the login fails.</a:t>
+            </a:r>
+          </a:p>
+          <a:p>
+            <a:r>
+              <a:rPr lang="en-GB" dirty="0"/>
+              <a:t>Previously, older .NET versions </a:t>
+            </a:r>
+            <a:r>
+              <a:rPr lang="en-GB" b="1" dirty="0"/>
+              <a:t>did not enforce encryption by default</a:t>
+            </a:r>
+            <a:r>
+              <a:rPr lang="en-GB" dirty="0"/>
+              <a:t>, so code worked without issues.</a:t>
+            </a:r>
+          </a:p>
+          <a:p>
             <a:endParaRPr lang="en-GB" dirty="0"/>
           </a:p>
         </p:txBody>
@@ -35550,7 +35674,7 @@
         <p:spPr>
           <a:xfrm>
             <a:off x="339971" y="1368986"/>
-            <a:ext cx="11517818" cy="4524315"/>
+            <a:ext cx="11517818" cy="4955203"/>
           </a:xfrm>
           <a:prstGeom prst="rect">
             <a:avLst/>
@@ -35623,6 +35747,29 @@
               </a:rPr>
               <a:t> = </a:t>
             </a:r>
+            <a:br>
+              <a:rPr lang="en-GB" sz="1600" b="1" dirty="0">
+                <a:solidFill>
+                  <a:srgbClr val="000000"/>
+                </a:solidFill>
+                <a:highlight>
+                  <a:srgbClr val="FFFFFF"/>
+                </a:highlight>
+                <a:latin typeface="Cascadia Mono" panose="020B0609020000020004" pitchFamily="49" charset="0"/>
+              </a:rPr>
+            </a:br>
+            <a:r>
+              <a:rPr lang="en-GB" sz="1600" b="1" dirty="0">
+                <a:solidFill>
+                  <a:srgbClr val="000000"/>
+                </a:solidFill>
+                <a:highlight>
+                  <a:srgbClr val="FFFFFF"/>
+                </a:highlight>
+                <a:latin typeface="Cascadia Mono" panose="020B0609020000020004" pitchFamily="49" charset="0"/>
+              </a:rPr>
+              <a:t>	     </a:t>
+            </a:r>
             <a:r>
               <a:rPr lang="en-GB" sz="1600" b="1" dirty="0">
                 <a:solidFill>
@@ -35727,14 +35874,14 @@
                 <a:highlight>
                   <a:srgbClr val="FFFFFF"/>
                 </a:highlight>
-                <a:latin typeface="Cascadia Mono" panose="020B0609020000020004" pitchFamily="49" charset="0"/>
+                <a:latin typeface="Consolas"/>
               </a:rPr>
-              <a:t>"</a:t>
-            </a:r>
-            <a:r>
-              <a:rPr lang="en-GB" sz="1600" b="1" dirty="0">
-                <a:solidFill>
-                  <a:srgbClr val="000000"/>
+              <a:t> </a:t>
+            </a:r>
+            <a:r>
+              <a:rPr lang="en-GB" sz="1200" b="1" dirty="0">
+                <a:solidFill>
+                  <a:srgbClr val="800000"/>
                 </a:solidFill>
                 <a:highlight>
                   <a:srgbClr val="FFFFFF"/>
@@ -35742,6 +35889,30 @@
                 <a:latin typeface="Cascadia Mono" panose="020B0609020000020004" pitchFamily="49" charset="0"/>
               </a:rPr>
               <a:t>;</a:t>
+            </a:r>
+            <a:r>
+              <a:rPr lang="en-GB" sz="1200" b="1" dirty="0" err="1">
+                <a:solidFill>
+                  <a:srgbClr val="800000"/>
+                </a:solidFill>
+                <a:highlight>
+                  <a:srgbClr val="FFFFFF"/>
+                </a:highlight>
+                <a:latin typeface="Cascadia Mono" panose="020B0609020000020004" pitchFamily="49" charset="0"/>
+              </a:rPr>
+              <a:t>TrustServerCertificate</a:t>
+            </a:r>
+            <a:r>
+              <a:rPr lang="en-GB" sz="1200" b="1" dirty="0">
+                <a:solidFill>
+                  <a:srgbClr val="800000"/>
+                </a:solidFill>
+                <a:highlight>
+                  <a:srgbClr val="FFFFFF"/>
+                </a:highlight>
+                <a:latin typeface="Cascadia Mono" panose="020B0609020000020004" pitchFamily="49" charset="0"/>
+              </a:rPr>
+              <a:t>=True ";</a:t>
             </a:r>
           </a:p>
           <a:p>
@@ -36605,7 +36776,7 @@
         </p:nvSpPr>
         <p:spPr>
           <a:xfrm>
-            <a:off x="646771" y="6154038"/>
+            <a:off x="646771" y="6217236"/>
             <a:ext cx="10983951" cy="400110"/>
           </a:xfrm>
           <a:prstGeom prst="rect">
@@ -38951,7 +39122,33 @@
                 <a:latin typeface="Times New Roman" panose="02020603050405020304" pitchFamily="18" charset="0"/>
                 <a:cs typeface="Times New Roman" panose="02020603050405020304" pitchFamily="18" charset="0"/>
               </a:rPr>
-              <a:t> Security=True" </a:t>
+              <a:t> Security=</a:t>
+            </a:r>
+            <a:r>
+              <a:rPr lang="en-GB" sz="1600" dirty="0" err="1">
+                <a:solidFill>
+                  <a:srgbClr val="800000"/>
+                </a:solidFill>
+                <a:highlight>
+                  <a:srgbClr val="FFFFFF"/>
+                </a:highlight>
+                <a:latin typeface="Times New Roman" panose="02020603050405020304" pitchFamily="18" charset="0"/>
+                <a:cs typeface="Times New Roman" panose="02020603050405020304" pitchFamily="18" charset="0"/>
+              </a:rPr>
+              <a:t>True;TrustServerCertificate</a:t>
+            </a:r>
+            <a:r>
+              <a:rPr lang="en-GB" sz="1600" dirty="0">
+                <a:solidFill>
+                  <a:srgbClr val="800000"/>
+                </a:solidFill>
+                <a:highlight>
+                  <a:srgbClr val="FFFFFF"/>
+                </a:highlight>
+                <a:latin typeface="Times New Roman" panose="02020603050405020304" pitchFamily="18" charset="0"/>
+                <a:cs typeface="Times New Roman" panose="02020603050405020304" pitchFamily="18" charset="0"/>
+              </a:rPr>
+              <a:t>=True" </a:t>
             </a:r>
             <a:r>
               <a:rPr lang="en-GB" sz="1600" dirty="0">
@@ -39766,7 +39963,7 @@
         <p:spPr>
           <a:xfrm>
             <a:off x="565572" y="2380166"/>
-            <a:ext cx="10875573" cy="3785652"/>
+            <a:ext cx="11340683" cy="3785652"/>
           </a:xfrm>
           <a:prstGeom prst="rect">
             <a:avLst/>
@@ -39981,10 +40178,19 @@
                 </a:solidFill>
                 <a:latin typeface="Consolas"/>
               </a:rPr>
-              <a:t>@"Data Source=.\</a:t>
-            </a:r>
-            <a:r>
-              <a:rPr lang="en-GB" sz="1600" b="1" dirty="0" err="1">
+              <a:t>@"</a:t>
+            </a:r>
+            <a:r>
+              <a:rPr lang="en-GB" sz="1400" b="1" dirty="0">
+                <a:solidFill>
+                  <a:srgbClr val="800000"/>
+                </a:solidFill>
+                <a:latin typeface="Consolas"/>
+              </a:rPr>
+              <a:t>Data Source=.\</a:t>
+            </a:r>
+            <a:r>
+              <a:rPr lang="en-GB" sz="1400" b="1" dirty="0" err="1">
                 <a:solidFill>
                   <a:srgbClr val="800000"/>
                 </a:solidFill>
@@ -39993,7 +40199,7 @@
               <a:t>sqlexpress;Initial</a:t>
             </a:r>
             <a:r>
-              <a:rPr lang="en-GB" sz="1600" b="1" dirty="0">
+              <a:rPr lang="en-GB" sz="1400" b="1" dirty="0">
                 <a:solidFill>
                   <a:srgbClr val="800000"/>
                 </a:solidFill>
@@ -40002,7 +40208,7 @@
               <a:t> </a:t>
             </a:r>
             <a:r>
-              <a:rPr lang="en-GB" sz="1600" b="1" dirty="0" err="1">
+              <a:rPr lang="en-GB" sz="1400" b="1" dirty="0" err="1">
                 <a:solidFill>
                   <a:srgbClr val="800000"/>
                 </a:solidFill>
@@ -40011,7 +40217,7 @@
               <a:t>Catalog</a:t>
             </a:r>
             <a:r>
-              <a:rPr lang="en-GB" sz="1600" b="1" dirty="0">
+              <a:rPr lang="en-GB" sz="1400" b="1" dirty="0">
                 <a:solidFill>
                   <a:srgbClr val="800000"/>
                 </a:solidFill>
@@ -40020,7 +40226,7 @@
               <a:t>=</a:t>
             </a:r>
             <a:r>
-              <a:rPr lang="en-GB" sz="1600" b="1" dirty="0" err="1">
+              <a:rPr lang="en-GB" sz="1400" b="1" dirty="0" err="1">
                 <a:solidFill>
                   <a:srgbClr val="800000"/>
                 </a:solidFill>
@@ -40029,13 +40235,51 @@
               <a:t>Northwind;Integrated</a:t>
             </a:r>
             <a:r>
-              <a:rPr lang="en-GB" sz="1600" b="1" dirty="0">
+              <a:rPr lang="en-GB" sz="1400" b="1" dirty="0">
                 <a:solidFill>
                   <a:srgbClr val="800000"/>
                 </a:solidFill>
                 <a:latin typeface="Consolas"/>
               </a:rPr>
-              <a:t> Security=True"</a:t>
+              <a:t> Security=</a:t>
+            </a:r>
+            <a:r>
+              <a:rPr lang="en-GB" sz="1400" b="1" dirty="0" err="1">
+                <a:solidFill>
+                  <a:srgbClr val="800000"/>
+                </a:solidFill>
+                <a:latin typeface="Consolas"/>
+              </a:rPr>
+              <a:t>True;</a:t>
+            </a:r>
+            <a:r>
+              <a:rPr lang="en-GB" sz="1400" b="1" dirty="0" err="1">
+                <a:solidFill>
+                  <a:srgbClr val="800000"/>
+                </a:solidFill>
+                <a:latin typeface="Times New Roman" panose="02020603050405020304" pitchFamily="18" charset="0"/>
+                <a:cs typeface="Times New Roman" panose="02020603050405020304" pitchFamily="18" charset="0"/>
+              </a:rPr>
+              <a:t>TrustServerCertificate</a:t>
+            </a:r>
+            <a:r>
+              <a:rPr lang="en-GB" sz="1400" b="1" dirty="0">
+                <a:solidFill>
+                  <a:srgbClr val="800000"/>
+                </a:solidFill>
+                <a:latin typeface="Times New Roman" panose="02020603050405020304" pitchFamily="18" charset="0"/>
+                <a:cs typeface="Times New Roman" panose="02020603050405020304" pitchFamily="18" charset="0"/>
+              </a:rPr>
+              <a:t>=True</a:t>
+            </a:r>
+            <a:r>
+              <a:rPr lang="en-GB" sz="1600" b="1" dirty="0">
+                <a:solidFill>
+                  <a:srgbClr val="800000"/>
+                </a:solidFill>
+                <a:latin typeface="Consolas"/>
+              </a:rPr>
+              <a:t>"</a:t>
             </a:r>
             <a:r>
               <a:rPr lang="en-GB" sz="1600" b="1" dirty="0">
@@ -42487,20 +42731,12 @@
 </file>
 
 <file path=customXml/item1.xml><?xml version="1.0" encoding="utf-8"?>
-<p:properties xmlns:p="http://schemas.microsoft.com/office/2006/metadata/properties" xmlns:xsi="http://www.w3.org/2001/XMLSchema-instance" xmlns:pc="http://schemas.microsoft.com/office/infopath/2007/PartnerControls">
-  <documentManagement>
-    <SequenceNumber xmlns="2884942A-A8DA-48EB-B9BF-C678FA91402D">12</SequenceNumber>
-    <IsBuildFile xmlns="2884942A-A8DA-48EB-B9BF-C678FA91402D" xsi:nil="true"/>
-    <BookTypeField0 xmlns="2884942A-A8DA-48EB-B9BF-C678FA91402D">
-      <Terms xmlns="http://schemas.microsoft.com/office/infopath/2007/PartnerControls">
-        <TermInfo xmlns="http://schemas.microsoft.com/office/infopath/2007/PartnerControls">
-          <TermName xmlns="http://schemas.microsoft.com/office/infopath/2007/PartnerControls">IK</TermName>
-          <TermId xmlns="http://schemas.microsoft.com/office/infopath/2007/PartnerControls">5abe6401-e87a-4499-80b4-3d21a1a6ebd7</TermId>
-        </TermInfo>
-      </Terms>
-    </BookTypeField0>
-  </documentManagement>
-</p:properties>
+<?mso-contentType ?>
+<FormTemplates xmlns="http://schemas.microsoft.com/sharepoint/v3/contenttype/forms">
+  <Display>DocumentLibraryForm</Display>
+  <Edit>DocumentLibraryForm</Edit>
+  <New>DocumentLibraryForm</New>
+</FormTemplates>
 </file>
 
 <file path=customXml/item2.xml><?xml version="1.0" encoding="utf-8"?>
@@ -42644,26 +42880,26 @@
 </file>
 
 <file path=customXml/item3.xml><?xml version="1.0" encoding="utf-8"?>
-<?mso-contentType ?>
-<FormTemplates xmlns="http://schemas.microsoft.com/sharepoint/v3/contenttype/forms">
-  <Display>DocumentLibraryForm</Display>
-  <Edit>DocumentLibraryForm</Edit>
-  <New>DocumentLibraryForm</New>
-</FormTemplates>
+<p:properties xmlns:p="http://schemas.microsoft.com/office/2006/metadata/properties" xmlns:xsi="http://www.w3.org/2001/XMLSchema-instance" xmlns:pc="http://schemas.microsoft.com/office/infopath/2007/PartnerControls">
+  <documentManagement>
+    <SequenceNumber xmlns="2884942A-A8DA-48EB-B9BF-C678FA91402D">12</SequenceNumber>
+    <IsBuildFile xmlns="2884942A-A8DA-48EB-B9BF-C678FA91402D" xsi:nil="true"/>
+    <BookTypeField0 xmlns="2884942A-A8DA-48EB-B9BF-C678FA91402D">
+      <Terms xmlns="http://schemas.microsoft.com/office/infopath/2007/PartnerControls">
+        <TermInfo xmlns="http://schemas.microsoft.com/office/infopath/2007/PartnerControls">
+          <TermName xmlns="http://schemas.microsoft.com/office/infopath/2007/PartnerControls">IK</TermName>
+          <TermId xmlns="http://schemas.microsoft.com/office/infopath/2007/PartnerControls">5abe6401-e87a-4499-80b4-3d21a1a6ebd7</TermId>
+        </TermInfo>
+      </Terms>
+    </BookTypeField0>
+  </documentManagement>
+</p:properties>
 </file>
 
 <file path=customXml/itemProps1.xml><?xml version="1.0" encoding="utf-8"?>
-<ds:datastoreItem xmlns:ds="http://schemas.openxmlformats.org/officeDocument/2006/customXml" ds:itemID="{5D30649F-1D28-4DBD-BCE8-9F22BAEC2CBB}">
+<ds:datastoreItem xmlns:ds="http://schemas.openxmlformats.org/officeDocument/2006/customXml" ds:itemID="{184A4CF0-96E4-48BA-A684-79930F565D8E}">
   <ds:schemaRefs>
-    <ds:schemaRef ds:uri="http://www.w3.org/XML/1998/namespace"/>
-    <ds:schemaRef ds:uri="2884942A-A8DA-48EB-B9BF-C678FA91402D"/>
-    <ds:schemaRef ds:uri="http://schemas.microsoft.com/office/infopath/2007/PartnerControls"/>
-    <ds:schemaRef ds:uri="http://purl.org/dc/terms/"/>
-    <ds:schemaRef ds:uri="http://purl.org/dc/elements/1.1/"/>
-    <ds:schemaRef ds:uri="http://schemas.microsoft.com/office/2006/metadata/properties"/>
-    <ds:schemaRef ds:uri="http://purl.org/dc/dcmitype/"/>
-    <ds:schemaRef ds:uri="http://schemas.microsoft.com/office/2006/documentManagement/types"/>
-    <ds:schemaRef ds:uri="http://schemas.openxmlformats.org/package/2006/metadata/core-properties"/>
+    <ds:schemaRef ds:uri="http://schemas.microsoft.com/sharepoint/v3/contenttype/forms"/>
   </ds:schemaRefs>
 </ds:datastoreItem>
 </file>
@@ -42687,9 +42923,17 @@
 </file>
 
 <file path=customXml/itemProps3.xml><?xml version="1.0" encoding="utf-8"?>
-<ds:datastoreItem xmlns:ds="http://schemas.openxmlformats.org/officeDocument/2006/customXml" ds:itemID="{184A4CF0-96E4-48BA-A684-79930F565D8E}">
+<ds:datastoreItem xmlns:ds="http://schemas.openxmlformats.org/officeDocument/2006/customXml" ds:itemID="{5D30649F-1D28-4DBD-BCE8-9F22BAEC2CBB}">
   <ds:schemaRefs>
-    <ds:schemaRef ds:uri="http://schemas.microsoft.com/sharepoint/v3/contenttype/forms"/>
+    <ds:schemaRef ds:uri="http://www.w3.org/XML/1998/namespace"/>
+    <ds:schemaRef ds:uri="2884942A-A8DA-48EB-B9BF-C678FA91402D"/>
+    <ds:schemaRef ds:uri="http://schemas.microsoft.com/office/infopath/2007/PartnerControls"/>
+    <ds:schemaRef ds:uri="http://purl.org/dc/terms/"/>
+    <ds:schemaRef ds:uri="http://purl.org/dc/elements/1.1/"/>
+    <ds:schemaRef ds:uri="http://schemas.microsoft.com/office/2006/metadata/properties"/>
+    <ds:schemaRef ds:uri="http://purl.org/dc/dcmitype/"/>
+    <ds:schemaRef ds:uri="http://schemas.microsoft.com/office/2006/documentManagement/types"/>
+    <ds:schemaRef ds:uri="http://schemas.openxmlformats.org/package/2006/metadata/core-properties"/>
   </ds:schemaRefs>
 </ds:datastoreItem>
 </file>
</xml_diff>